<commit_message>
Update SMS Spam Detection - Machine Learning Intermediate Project.pptx
</commit_message>
<xml_diff>
--- a/Naive Bayes Classification - SMS Spam Detection/SMS Spam Detection - Machine Learning Intermediate Project.pptx
+++ b/Naive Bayes Classification - SMS Spam Detection/SMS Spam Detection - Machine Learning Intermediate Project.pptx
@@ -5,18 +5,21 @@
     <p:sldMasterId id="2147483648" r:id="rId1"/>
   </p:sldMasterIdLst>
   <p:notesMasterIdLst>
-    <p:notesMasterId r:id="rId11"/>
+    <p:notesMasterId r:id="rId14"/>
   </p:notesMasterIdLst>
   <p:sldIdLst>
     <p:sldId id="256" r:id="rId2"/>
     <p:sldId id="257" r:id="rId3"/>
-    <p:sldId id="259" r:id="rId4"/>
-    <p:sldId id="260" r:id="rId5"/>
-    <p:sldId id="261" r:id="rId6"/>
-    <p:sldId id="262" r:id="rId7"/>
-    <p:sldId id="263" r:id="rId8"/>
-    <p:sldId id="264" r:id="rId9"/>
-    <p:sldId id="265" r:id="rId10"/>
+    <p:sldId id="266" r:id="rId4"/>
+    <p:sldId id="259" r:id="rId5"/>
+    <p:sldId id="260" r:id="rId6"/>
+    <p:sldId id="261" r:id="rId7"/>
+    <p:sldId id="267" r:id="rId8"/>
+    <p:sldId id="262" r:id="rId9"/>
+    <p:sldId id="268" r:id="rId10"/>
+    <p:sldId id="263" r:id="rId11"/>
+    <p:sldId id="264" r:id="rId12"/>
+    <p:sldId id="265" r:id="rId13"/>
   </p:sldIdLst>
   <p:sldSz cx="12192000" cy="6858000"/>
   <p:notesSz cx="6858000" cy="9144000"/>
@@ -205,7 +208,7 @@
           <a:p>
             <a:fld id="{8E90A412-802D-EC44-88BC-C903320BA2B5}" type="datetimeFigureOut">
               <a:rPr lang="en-US" smtClean="0"/>
-              <a:t>2/10/2020</a:t>
+              <a:t>2/15/2020</a:t>
             </a:fld>
             <a:endParaRPr lang="en-US"/>
           </a:p>
@@ -779,7 +782,7 @@
           <a:p>
             <a:fld id="{48A87A34-81AB-432B-8DAE-1953F412C126}" type="datetimeFigureOut">
               <a:rPr lang="en-US" dirty="0"/>
-              <a:t>2/10/2020</a:t>
+              <a:t>2/15/2020</a:t>
             </a:fld>
             <a:endParaRPr lang="en-US" dirty="0"/>
           </a:p>
@@ -985,7 +988,7 @@
           <a:p>
             <a:fld id="{48A87A34-81AB-432B-8DAE-1953F412C126}" type="datetimeFigureOut">
               <a:rPr lang="en-US" dirty="0"/>
-              <a:t>2/10/2020</a:t>
+              <a:t>2/15/2020</a:t>
             </a:fld>
             <a:endParaRPr lang="en-US" dirty="0"/>
           </a:p>
@@ -1195,7 +1198,7 @@
           <a:p>
             <a:fld id="{48A87A34-81AB-432B-8DAE-1953F412C126}" type="datetimeFigureOut">
               <a:rPr lang="en-US" dirty="0"/>
-              <a:t>2/10/2020</a:t>
+              <a:t>2/15/2020</a:t>
             </a:fld>
             <a:endParaRPr lang="en-US" dirty="0"/>
           </a:p>
@@ -1391,7 +1394,7 @@
           <a:p>
             <a:fld id="{48A87A34-81AB-432B-8DAE-1953F412C126}" type="datetimeFigureOut">
               <a:rPr lang="en-US" dirty="0"/>
-              <a:t>2/10/2020</a:t>
+              <a:t>2/15/2020</a:t>
             </a:fld>
             <a:endParaRPr lang="en-US" dirty="0"/>
           </a:p>
@@ -1665,7 +1668,7 @@
           <a:p>
             <a:fld id="{48A87A34-81AB-432B-8DAE-1953F412C126}" type="datetimeFigureOut">
               <a:rPr lang="en-US" dirty="0"/>
-              <a:t>2/10/2020</a:t>
+              <a:t>2/15/2020</a:t>
             </a:fld>
             <a:endParaRPr lang="en-US" dirty="0"/>
           </a:p>
@@ -1928,7 +1931,7 @@
           <a:p>
             <a:fld id="{48A87A34-81AB-432B-8DAE-1953F412C126}" type="datetimeFigureOut">
               <a:rPr lang="en-US" dirty="0"/>
-              <a:t>2/10/2020</a:t>
+              <a:t>2/15/2020</a:t>
             </a:fld>
             <a:endParaRPr lang="en-US" dirty="0"/>
           </a:p>
@@ -2339,7 +2342,7 @@
           <a:p>
             <a:fld id="{48A87A34-81AB-432B-8DAE-1953F412C126}" type="datetimeFigureOut">
               <a:rPr lang="en-US" dirty="0"/>
-              <a:t>2/10/2020</a:t>
+              <a:t>2/15/2020</a:t>
             </a:fld>
             <a:endParaRPr lang="en-US" dirty="0"/>
           </a:p>
@@ -2483,7 +2486,7 @@
           <a:p>
             <a:fld id="{48A87A34-81AB-432B-8DAE-1953F412C126}" type="datetimeFigureOut">
               <a:rPr lang="en-US" dirty="0"/>
-              <a:t>2/10/2020</a:t>
+              <a:t>2/15/2020</a:t>
             </a:fld>
             <a:endParaRPr lang="en-US" dirty="0"/>
           </a:p>
@@ -2604,7 +2607,7 @@
           <a:p>
             <a:fld id="{48A87A34-81AB-432B-8DAE-1953F412C126}" type="datetimeFigureOut">
               <a:rPr lang="en-US" dirty="0"/>
-              <a:t>2/10/2020</a:t>
+              <a:t>2/15/2020</a:t>
             </a:fld>
             <a:endParaRPr lang="en-US" dirty="0"/>
           </a:p>
@@ -2850,7 +2853,7 @@
           <a:p>
             <a:fld id="{48A87A34-81AB-432B-8DAE-1953F412C126}" type="datetimeFigureOut">
               <a:rPr lang="en-US" dirty="0"/>
-              <a:t>2/10/2020</a:t>
+              <a:t>2/15/2020</a:t>
             </a:fld>
             <a:endParaRPr lang="en-US" dirty="0"/>
           </a:p>
@@ -3291,7 +3294,7 @@
             <a:fld id="{48A87A34-81AB-432B-8DAE-1953F412C126}" type="datetimeFigureOut">
               <a:rPr lang="en-US" dirty="0"/>
               <a:pPr/>
-              <a:t>2/10/2020</a:t>
+              <a:t>2/15/2020</a:t>
             </a:fld>
             <a:endParaRPr lang="en-US" dirty="0"/>
           </a:p>
@@ -3613,7 +3616,7 @@
             <a:fld id="{48A87A34-81AB-432B-8DAE-1953F412C126}" type="datetimeFigureOut">
               <a:rPr lang="en-US" dirty="0"/>
               <a:pPr/>
-              <a:t>2/10/2020</a:t>
+              <a:t>2/15/2020</a:t>
             </a:fld>
             <a:endParaRPr lang="en-US" dirty="0"/>
           </a:p>
@@ -4166,8 +4169,12 @@
           <a:p>
             <a:pPr algn="r"/>
             <a:r>
+              <a:rPr lang="en-US" b="1"/>
+              <a:t>GCDAI </a:t>
+            </a:r>
+            <a:r>
               <a:rPr lang="en-US" b="1" dirty="0"/>
-              <a:t>GCD - June '08 batch, INSAID</a:t>
+              <a:t>- June '08 batch, INSAID</a:t>
             </a:r>
           </a:p>
           <a:p>
@@ -4187,6 +4194,299 @@
     <p:extLst>
       <p:ext uri="{BB962C8B-B14F-4D97-AF65-F5344CB8AC3E}">
         <p14:creationId xmlns:p14="http://schemas.microsoft.com/office/powerpoint/2010/main" val="704802350"/>
+      </p:ext>
+    </p:extLst>
+  </p:cSld>
+  <p:clrMapOvr>
+    <a:masterClrMapping/>
+  </p:clrMapOvr>
+</p:sld>
+</file>
+
+<file path=ppt/slides/slide10.xml><?xml version="1.0" encoding="utf-8"?>
+<p:sld xmlns:a="http://schemas.openxmlformats.org/drawingml/2006/main" xmlns:r="http://schemas.openxmlformats.org/officeDocument/2006/relationships" xmlns:p="http://schemas.openxmlformats.org/presentationml/2006/main">
+  <p:cSld>
+    <p:spTree>
+      <p:nvGrpSpPr>
+        <p:cNvPr id="1" name=""/>
+        <p:cNvGrpSpPr/>
+        <p:nvPr/>
+      </p:nvGrpSpPr>
+      <p:grpSpPr>
+        <a:xfrm>
+          <a:off x="0" y="0"/>
+          <a:ext cx="0" cy="0"/>
+          <a:chOff x="0" y="0"/>
+          <a:chExt cx="0" cy="0"/>
+        </a:xfrm>
+      </p:grpSpPr>
+      <p:sp>
+        <p:nvSpPr>
+          <p:cNvPr id="2" name="Title 1"/>
+          <p:cNvSpPr>
+            <a:spLocks noGrp="1"/>
+          </p:cNvSpPr>
+          <p:nvPr>
+            <p:ph type="title"/>
+          </p:nvPr>
+        </p:nvSpPr>
+        <p:spPr/>
+        <p:txBody>
+          <a:bodyPr/>
+          <a:lstStyle/>
+          <a:p>
+            <a:r>
+              <a:rPr lang="en-GB" dirty="0"/>
+              <a:t>Building Support Vector Classification</a:t>
+            </a:r>
+          </a:p>
+        </p:txBody>
+      </p:sp>
+      <p:pic>
+        <p:nvPicPr>
+          <p:cNvPr id="7" name="Content Placeholder 6">
+            <a:extLst>
+              <a:ext uri="{FF2B5EF4-FFF2-40B4-BE49-F238E27FC236}">
+                <a16:creationId xmlns:a16="http://schemas.microsoft.com/office/drawing/2014/main" id="{4C68B834-7664-4F78-93A5-B95C8F055FE9}"/>
+              </a:ext>
+            </a:extLst>
+          </p:cNvPr>
+          <p:cNvPicPr>
+            <a:picLocks noGrp="1" noChangeAspect="1"/>
+          </p:cNvPicPr>
+          <p:nvPr>
+            <p:ph idx="1"/>
+          </p:nvPr>
+        </p:nvPicPr>
+        <p:blipFill>
+          <a:blip r:embed="rId2"/>
+          <a:stretch>
+            <a:fillRect/>
+          </a:stretch>
+        </p:blipFill>
+        <p:spPr>
+          <a:xfrm>
+            <a:off x="2958430" y="1881890"/>
+            <a:ext cx="6589571" cy="4199727"/>
+          </a:xfrm>
+        </p:spPr>
+      </p:pic>
+    </p:spTree>
+    <p:extLst>
+      <p:ext uri="{BB962C8B-B14F-4D97-AF65-F5344CB8AC3E}">
+        <p14:creationId xmlns:p14="http://schemas.microsoft.com/office/powerpoint/2010/main" val="939989102"/>
+      </p:ext>
+    </p:extLst>
+  </p:cSld>
+  <p:clrMapOvr>
+    <a:masterClrMapping/>
+  </p:clrMapOvr>
+</p:sld>
+</file>
+
+<file path=ppt/slides/slide11.xml><?xml version="1.0" encoding="utf-8"?>
+<p:sld xmlns:a="http://schemas.openxmlformats.org/drawingml/2006/main" xmlns:r="http://schemas.openxmlformats.org/officeDocument/2006/relationships" xmlns:p="http://schemas.openxmlformats.org/presentationml/2006/main">
+  <p:cSld>
+    <p:spTree>
+      <p:nvGrpSpPr>
+        <p:cNvPr id="1" name=""/>
+        <p:cNvGrpSpPr/>
+        <p:nvPr/>
+      </p:nvGrpSpPr>
+      <p:grpSpPr>
+        <a:xfrm>
+          <a:off x="0" y="0"/>
+          <a:ext cx="0" cy="0"/>
+          <a:chOff x="0" y="0"/>
+          <a:chExt cx="0" cy="0"/>
+        </a:xfrm>
+      </p:grpSpPr>
+      <p:sp>
+        <p:nvSpPr>
+          <p:cNvPr id="2" name="Title 1"/>
+          <p:cNvSpPr>
+            <a:spLocks noGrp="1"/>
+          </p:cNvSpPr>
+          <p:nvPr>
+            <p:ph type="title"/>
+          </p:nvPr>
+        </p:nvSpPr>
+        <p:spPr/>
+        <p:txBody>
+          <a:bodyPr/>
+          <a:lstStyle/>
+          <a:p>
+            <a:r>
+              <a:rPr lang="en-US" dirty="0"/>
+              <a:t>Model evaluation</a:t>
+            </a:r>
+          </a:p>
+        </p:txBody>
+      </p:sp>
+      <p:sp>
+        <p:nvSpPr>
+          <p:cNvPr id="6" name="Content Placeholder 5">
+            <a:extLst>
+              <a:ext uri="{FF2B5EF4-FFF2-40B4-BE49-F238E27FC236}">
+                <a16:creationId xmlns:a16="http://schemas.microsoft.com/office/drawing/2014/main" id="{0EBC8287-68DB-4016-9D82-4983F45D3F32}"/>
+              </a:ext>
+            </a:extLst>
+          </p:cNvPr>
+          <p:cNvSpPr>
+            <a:spLocks noGrp="1"/>
+          </p:cNvSpPr>
+          <p:nvPr>
+            <p:ph idx="1"/>
+          </p:nvPr>
+        </p:nvSpPr>
+        <p:spPr>
+          <a:xfrm>
+            <a:off x="1451580" y="2015732"/>
+            <a:ext cx="9603274" cy="3450613"/>
+          </a:xfrm>
+        </p:spPr>
+        <p:txBody>
+          <a:bodyPr/>
+          <a:lstStyle/>
+          <a:p>
+            <a:r>
+              <a:rPr lang="en-GB" dirty="0"/>
+              <a:t>Naive Bayes model can predict the spam messages with 98.4% accuracy.</a:t>
+            </a:r>
+          </a:p>
+          <a:p>
+            <a:r>
+              <a:rPr lang="en-GB" dirty="0"/>
+              <a:t>Support Vector Classification model can predict the spam messages with 99.01% accuracy. </a:t>
+            </a:r>
+          </a:p>
+          <a:p>
+            <a:endParaRPr lang="en-GB" dirty="0"/>
+          </a:p>
+          <a:p>
+            <a:r>
+              <a:rPr lang="en-GB" dirty="0"/>
+              <a:t>Only 11 out of 1115 predictions are wrong from Support Vector Classification model</a:t>
+            </a:r>
+          </a:p>
+          <a:p>
+            <a:r>
+              <a:rPr lang="en-GB" dirty="0"/>
+              <a:t>Naive Bayes model made 17 out of 1115 predictions wrongly.</a:t>
+            </a:r>
+          </a:p>
+        </p:txBody>
+      </p:sp>
+    </p:spTree>
+    <p:extLst>
+      <p:ext uri="{BB962C8B-B14F-4D97-AF65-F5344CB8AC3E}">
+        <p14:creationId xmlns:p14="http://schemas.microsoft.com/office/powerpoint/2010/main" val="1935307973"/>
+      </p:ext>
+    </p:extLst>
+  </p:cSld>
+  <p:clrMapOvr>
+    <a:masterClrMapping/>
+  </p:clrMapOvr>
+</p:sld>
+</file>
+
+<file path=ppt/slides/slide12.xml><?xml version="1.0" encoding="utf-8"?>
+<p:sld xmlns:a="http://schemas.openxmlformats.org/drawingml/2006/main" xmlns:r="http://schemas.openxmlformats.org/officeDocument/2006/relationships" xmlns:p="http://schemas.openxmlformats.org/presentationml/2006/main">
+  <p:cSld>
+    <p:spTree>
+      <p:nvGrpSpPr>
+        <p:cNvPr id="1" name=""/>
+        <p:cNvGrpSpPr/>
+        <p:nvPr/>
+      </p:nvGrpSpPr>
+      <p:grpSpPr>
+        <a:xfrm>
+          <a:off x="0" y="0"/>
+          <a:ext cx="0" cy="0"/>
+          <a:chOff x="0" y="0"/>
+          <a:chExt cx="0" cy="0"/>
+        </a:xfrm>
+      </p:grpSpPr>
+      <p:sp>
+        <p:nvSpPr>
+          <p:cNvPr id="2" name="Title 1"/>
+          <p:cNvSpPr>
+            <a:spLocks noGrp="1"/>
+          </p:cNvSpPr>
+          <p:nvPr>
+            <p:ph type="title"/>
+          </p:nvPr>
+        </p:nvSpPr>
+        <p:spPr/>
+        <p:txBody>
+          <a:bodyPr>
+            <a:normAutofit/>
+          </a:bodyPr>
+          <a:lstStyle/>
+          <a:p>
+            <a:r>
+              <a:rPr lang="en-US" dirty="0"/>
+              <a:t>conclusion</a:t>
+            </a:r>
+          </a:p>
+        </p:txBody>
+      </p:sp>
+      <p:sp>
+        <p:nvSpPr>
+          <p:cNvPr id="5" name="Content Placeholder 4">
+            <a:extLst>
+              <a:ext uri="{FF2B5EF4-FFF2-40B4-BE49-F238E27FC236}">
+                <a16:creationId xmlns:a16="http://schemas.microsoft.com/office/drawing/2014/main" id="{E708ECC9-422B-4BC0-8340-AC3301C30299}"/>
+              </a:ext>
+            </a:extLst>
+          </p:cNvPr>
+          <p:cNvSpPr>
+            <a:spLocks noGrp="1"/>
+          </p:cNvSpPr>
+          <p:nvPr>
+            <p:ph idx="1"/>
+          </p:nvPr>
+        </p:nvSpPr>
+        <p:spPr>
+          <a:xfrm>
+            <a:off x="1451579" y="2015732"/>
+            <a:ext cx="9603275" cy="3450613"/>
+          </a:xfrm>
+        </p:spPr>
+        <p:txBody>
+          <a:bodyPr>
+            <a:normAutofit/>
+          </a:bodyPr>
+          <a:lstStyle/>
+          <a:p>
+            <a:r>
+              <a:rPr lang="en-GB" sz="2400" dirty="0"/>
+              <a:t>Based on our models built and evaluation criteria's,</a:t>
+            </a:r>
+          </a:p>
+          <a:p>
+            <a:pPr lvl="1"/>
+            <a:r>
+              <a:rPr lang="en-GB" sz="2400" dirty="0"/>
+              <a:t>For our data, Support Vector Classification seems to be the better model for making the futuristic predictions.</a:t>
+            </a:r>
+          </a:p>
+          <a:p>
+            <a:pPr lvl="1"/>
+            <a:r>
+              <a:rPr lang="en-GB" sz="2400" dirty="0"/>
+              <a:t>Thus, Support Vector Classification is the best model that can predict the future incoming spam messages more accurately for our business problem.</a:t>
+            </a:r>
+          </a:p>
+          <a:p>
+            <a:endParaRPr lang="en-GB" sz="2400" dirty="0"/>
+          </a:p>
+        </p:txBody>
+      </p:sp>
+    </p:spTree>
+    <p:extLst>
+      <p:ext uri="{BB962C8B-B14F-4D97-AF65-F5344CB8AC3E}">
+        <p14:creationId xmlns:p14="http://schemas.microsoft.com/office/powerpoint/2010/main" val="364743583"/>
       </p:ext>
     </p:extLst>
   </p:cSld>
@@ -4260,7 +4560,7 @@
           <a:p>
             <a:r>
               <a:rPr lang="en-GB" sz="2400" dirty="0"/>
-              <a:t>In this project we will take a look at classifying SMS messages using the Machine Learning model, understand Machine Learning works well for this use case. So let’s get started!</a:t>
+              <a:t>In this project we will take a look at classifying SMS messages using the Machine Learning model, understand how well Machine Learning works for this use case. So let’s get started!</a:t>
             </a:r>
           </a:p>
           <a:p>
@@ -4300,7 +4600,13 @@
       </p:grpSpPr>
       <p:sp>
         <p:nvSpPr>
-          <p:cNvPr id="2" name="Title 1"/>
+          <p:cNvPr id="2" name="Title 1">
+            <a:extLst>
+              <a:ext uri="{FF2B5EF4-FFF2-40B4-BE49-F238E27FC236}">
+                <a16:creationId xmlns:a16="http://schemas.microsoft.com/office/drawing/2014/main" id="{EF5CF412-9FD9-4E54-816F-470B5D7D318E}"/>
+              </a:ext>
+            </a:extLst>
+          </p:cNvPr>
           <p:cNvSpPr>
             <a:spLocks noGrp="1"/>
           </p:cNvSpPr>
@@ -4310,21 +4616,33 @@
         </p:nvSpPr>
         <p:spPr/>
         <p:txBody>
-          <a:bodyPr>
-            <a:normAutofit/>
-          </a:bodyPr>
+          <a:bodyPr/>
           <a:lstStyle/>
           <a:p>
             <a:r>
               <a:rPr lang="en-GB" dirty="0"/>
-              <a:t>Visualizing the length of SMS messages</a:t>
+              <a:t>Loading the </a:t>
+            </a:r>
+            <a:r>
+              <a:rPr lang="en-GB" dirty="0" err="1"/>
+              <a:t>sms</a:t>
+            </a:r>
+            <a:r>
+              <a:rPr lang="en-GB" dirty="0"/>
+              <a:t> data into the project</a:t>
             </a:r>
           </a:p>
         </p:txBody>
       </p:sp>
       <p:pic>
         <p:nvPicPr>
-          <p:cNvPr id="4" name="Content Placeholder 3"/>
+          <p:cNvPr id="4" name="Content Placeholder 3">
+            <a:extLst>
+              <a:ext uri="{FF2B5EF4-FFF2-40B4-BE49-F238E27FC236}">
+                <a16:creationId xmlns:a16="http://schemas.microsoft.com/office/drawing/2014/main" id="{0CC3D50A-0D80-4EB5-8AAE-0557C7DA5791}"/>
+              </a:ext>
+            </a:extLst>
+          </p:cNvPr>
           <p:cNvPicPr>
             <a:picLocks noGrp="1" noChangeAspect="1"/>
           </p:cNvPicPr>
@@ -4334,26 +4652,36 @@
         </p:nvPicPr>
         <p:blipFill>
           <a:blip r:embed="rId2"/>
-          <a:srcRect/>
-          <a:stretch/>
+          <a:stretch>
+            <a:fillRect/>
+          </a:stretch>
         </p:blipFill>
         <p:spPr>
           <a:xfrm>
-            <a:off x="1474483" y="1910027"/>
-            <a:ext cx="6753515" cy="4229142"/>
-          </a:xfrm>
+            <a:off x="1456268" y="2571747"/>
+            <a:ext cx="6046501" cy="2808582"/>
+          </a:xfrm>
+          <a:prstGeom prst="rect">
+            <a:avLst/>
+          </a:prstGeom>
         </p:spPr>
       </p:pic>
       <p:sp>
         <p:nvSpPr>
-          <p:cNvPr id="3" name="TextBox 2"/>
+          <p:cNvPr id="5" name="TextBox 4">
+            <a:extLst>
+              <a:ext uri="{FF2B5EF4-FFF2-40B4-BE49-F238E27FC236}">
+                <a16:creationId xmlns:a16="http://schemas.microsoft.com/office/drawing/2014/main" id="{F90AB05F-240E-4003-934E-3CF43F424D1C}"/>
+              </a:ext>
+            </a:extLst>
+          </p:cNvPr>
           <p:cNvSpPr txBox="1"/>
           <p:nvPr/>
         </p:nvSpPr>
         <p:spPr>
           <a:xfrm>
-            <a:off x="8654048" y="2571748"/>
-            <a:ext cx="3064340" cy="2554545"/>
+            <a:off x="8074921" y="2390989"/>
+            <a:ext cx="2979933" cy="3170099"/>
           </a:xfrm>
           <a:prstGeom prst="rect">
             <a:avLst/>
@@ -4368,28 +4696,60 @@
           <a:p>
             <a:r>
               <a:rPr lang="en-GB" sz="2000" dirty="0"/>
-              <a:t>From the </a:t>
+              <a:t>Our data has two columns.</a:t>
+            </a:r>
+          </a:p>
+          <a:p>
+            <a:pPr marL="342900" indent="-342900">
+              <a:buFont typeface="Arial" panose="020B0604020202020204" pitchFamily="34" charset="0"/>
+              <a:buChar char="•"/>
+            </a:pPr>
+            <a:r>
+              <a:rPr lang="en-GB" sz="2000" dirty="0" err="1"/>
+              <a:t>sms</a:t>
+            </a:r>
+            <a:r>
+              <a:rPr lang="en-GB" sz="2000" dirty="0"/>
+              <a:t> – containing the combination of words.</a:t>
+            </a:r>
+          </a:p>
+          <a:p>
+            <a:pPr marL="342900" indent="-342900">
+              <a:buFont typeface="Arial" panose="020B0604020202020204" pitchFamily="34" charset="0"/>
+              <a:buChar char="•"/>
+            </a:pPr>
+            <a:r>
+              <a:rPr lang="en-GB" sz="2000" dirty="0"/>
+              <a:t>Label – Target variable.</a:t>
+            </a:r>
+          </a:p>
+          <a:p>
+            <a:pPr marL="342900" indent="-342900">
+              <a:buFont typeface="Arial" panose="020B0604020202020204" pitchFamily="34" charset="0"/>
+              <a:buChar char="•"/>
+            </a:pPr>
+            <a:endParaRPr lang="en-GB" sz="2000" dirty="0"/>
+          </a:p>
+          <a:p>
+            <a:r>
+              <a:rPr lang="en-GB" sz="2000" dirty="0"/>
+              <a:t>We are going to use </a:t>
             </a:r>
             <a:r>
               <a:rPr lang="en-GB" sz="2000" b="1" dirty="0"/>
-              <a:t>visualization</a:t>
+              <a:t>Natural Language Processing </a:t>
             </a:r>
             <a:r>
               <a:rPr lang="en-GB" sz="2000" dirty="0"/>
-              <a:t>, we can able to understand that most of the messages are of lesser length of 200 characters.</a:t>
-            </a:r>
-          </a:p>
-          <a:p>
-            <a:endParaRPr lang="en-GB" sz="2000" dirty="0"/>
-          </a:p>
-          <a:p>
+              <a:t>to understand to certain extent like </a:t>
+            </a:r>
+            <a:r>
+              <a:rPr lang="en-GB" sz="2000" b="1" dirty="0"/>
+              <a:t>text mining</a:t>
+            </a:r>
             <a:r>
               <a:rPr lang="en-GB" sz="2000" dirty="0"/>
-              <a:t>Distribution of the SMS length is </a:t>
-            </a:r>
-            <a:r>
-              <a:rPr lang="en-GB" sz="2000" b="1" dirty="0"/>
-              <a:t>right skewed.</a:t>
+              <a:t>.</a:t>
             </a:r>
           </a:p>
         </p:txBody>
@@ -4397,7 +4757,7 @@
     </p:spTree>
     <p:extLst>
       <p:ext uri="{BB962C8B-B14F-4D97-AF65-F5344CB8AC3E}">
-        <p14:creationId xmlns:p14="http://schemas.microsoft.com/office/powerpoint/2010/main" val="134900468"/>
+        <p14:creationId xmlns:p14="http://schemas.microsoft.com/office/powerpoint/2010/main" val="1787494981"/>
       </p:ext>
     </p:extLst>
   </p:cSld>
@@ -4436,12 +4796,14 @@
         </p:nvSpPr>
         <p:spPr/>
         <p:txBody>
-          <a:bodyPr/>
+          <a:bodyPr>
+            <a:normAutofit/>
+          </a:bodyPr>
           <a:lstStyle/>
           <a:p>
             <a:r>
               <a:rPr lang="en-GB" dirty="0"/>
-              <a:t>Visualizing length of ham &amp; spam messages</a:t>
+              <a:t>Visualizing the length of SMS messages</a:t>
             </a:r>
           </a:p>
         </p:txBody>
@@ -4463,15 +4825,65 @@
         </p:blipFill>
         <p:spPr>
           <a:xfrm>
-            <a:off x="1072641" y="1853754"/>
-            <a:ext cx="10057241" cy="4199727"/>
+            <a:off x="1474483" y="1910027"/>
+            <a:ext cx="6753515" cy="4229142"/>
           </a:xfrm>
         </p:spPr>
       </p:pic>
+      <p:sp>
+        <p:nvSpPr>
+          <p:cNvPr id="3" name="TextBox 2"/>
+          <p:cNvSpPr txBox="1"/>
+          <p:nvPr/>
+        </p:nvSpPr>
+        <p:spPr>
+          <a:xfrm>
+            <a:off x="8654048" y="2571748"/>
+            <a:ext cx="3064340" cy="2554545"/>
+          </a:xfrm>
+          <a:prstGeom prst="rect">
+            <a:avLst/>
+          </a:prstGeom>
+          <a:noFill/>
+        </p:spPr>
+        <p:txBody>
+          <a:bodyPr wrap="square" rtlCol="0">
+            <a:spAutoFit/>
+          </a:bodyPr>
+          <a:lstStyle/>
+          <a:p>
+            <a:r>
+              <a:rPr lang="en-GB" sz="2000" dirty="0"/>
+              <a:t>From the </a:t>
+            </a:r>
+            <a:r>
+              <a:rPr lang="en-GB" sz="2000" b="1" dirty="0"/>
+              <a:t>visualization</a:t>
+            </a:r>
+            <a:r>
+              <a:rPr lang="en-GB" sz="2000" dirty="0"/>
+              <a:t>, we can able to understand that most of the messages are of lesser length of 200 characters.</a:t>
+            </a:r>
+          </a:p>
+          <a:p>
+            <a:endParaRPr lang="en-GB" sz="2000" dirty="0"/>
+          </a:p>
+          <a:p>
+            <a:r>
+              <a:rPr lang="en-GB" sz="2000" dirty="0"/>
+              <a:t>Distribution of the SMS length is </a:t>
+            </a:r>
+            <a:r>
+              <a:rPr lang="en-GB" sz="2000" b="1" dirty="0"/>
+              <a:t>right skewed.</a:t>
+            </a:r>
+          </a:p>
+        </p:txBody>
+      </p:sp>
     </p:spTree>
     <p:extLst>
       <p:ext uri="{BB962C8B-B14F-4D97-AF65-F5344CB8AC3E}">
-        <p14:creationId xmlns:p14="http://schemas.microsoft.com/office/powerpoint/2010/main" val="1421567037"/>
+        <p14:creationId xmlns:p14="http://schemas.microsoft.com/office/powerpoint/2010/main" val="134900468"/>
       </p:ext>
     </p:extLst>
   </p:cSld>
@@ -4514,21 +4926,15 @@
           <a:lstStyle/>
           <a:p>
             <a:r>
-              <a:rPr lang="en-US" dirty="0"/>
-              <a:t>Bag of words approach</a:t>
+              <a:rPr lang="en-GB" dirty="0"/>
+              <a:t>Visualizing length of ham &amp; spam messages</a:t>
             </a:r>
           </a:p>
         </p:txBody>
       </p:sp>
       <p:pic>
         <p:nvPicPr>
-          <p:cNvPr id="8" name="Content Placeholder 7">
-            <a:extLst>
-              <a:ext uri="{FF2B5EF4-FFF2-40B4-BE49-F238E27FC236}">
-                <a16:creationId xmlns:a16="http://schemas.microsoft.com/office/drawing/2014/main" id="{019C6851-F09F-46BE-BF0D-B7A21A82EACD}"/>
-              </a:ext>
-            </a:extLst>
-          </p:cNvPr>
+          <p:cNvPr id="4" name="Content Placeholder 3"/>
           <p:cNvPicPr>
             <a:picLocks noGrp="1" noChangeAspect="1"/>
           </p:cNvPicPr>
@@ -4538,100 +4944,20 @@
         </p:nvPicPr>
         <p:blipFill>
           <a:blip r:embed="rId2"/>
-          <a:stretch>
-            <a:fillRect/>
-          </a:stretch>
+          <a:srcRect/>
+          <a:stretch/>
         </p:blipFill>
         <p:spPr>
           <a:xfrm>
-            <a:off x="376403" y="2458488"/>
-            <a:ext cx="8289296" cy="2559828"/>
+            <a:off x="1072641" y="1853754"/>
+            <a:ext cx="10057241" cy="4199727"/>
           </a:xfrm>
         </p:spPr>
       </p:pic>
-      <p:sp>
-        <p:nvSpPr>
-          <p:cNvPr id="10" name="TextBox 9">
-            <a:extLst>
-              <a:ext uri="{FF2B5EF4-FFF2-40B4-BE49-F238E27FC236}">
-                <a16:creationId xmlns:a16="http://schemas.microsoft.com/office/drawing/2014/main" id="{A795BCC8-E854-41CF-BA9F-803965DB298E}"/>
-              </a:ext>
-            </a:extLst>
-          </p:cNvPr>
-          <p:cNvSpPr txBox="1"/>
-          <p:nvPr/>
-        </p:nvSpPr>
-        <p:spPr>
-          <a:xfrm>
-            <a:off x="8820444" y="2141925"/>
-            <a:ext cx="3151164" cy="2862322"/>
-          </a:xfrm>
-          <a:prstGeom prst="rect">
-            <a:avLst/>
-          </a:prstGeom>
-          <a:noFill/>
-        </p:spPr>
-        <p:txBody>
-          <a:bodyPr wrap="square" rtlCol="0">
-            <a:spAutoFit/>
-          </a:bodyPr>
-          <a:lstStyle/>
-          <a:p>
-            <a:pPr algn="ctr">
-              <a:lnSpc>
-                <a:spcPct val="300000"/>
-              </a:lnSpc>
-            </a:pPr>
-            <a:r>
-              <a:rPr lang="en-GB" b="1" u="sng" dirty="0"/>
-              <a:t>SMS Texts Messages</a:t>
-            </a:r>
-          </a:p>
-          <a:p>
-            <a:pPr marL="342900" indent="-342900">
-              <a:buAutoNum type="arabicPeriod"/>
-            </a:pPr>
-            <a:r>
-              <a:rPr lang="en-GB" dirty="0"/>
-              <a:t>Hello, how are you!</a:t>
-            </a:r>
-          </a:p>
-          <a:p>
-            <a:pPr marL="342900" indent="-342900">
-              <a:buAutoNum type="arabicPeriod"/>
-            </a:pPr>
-            <a:endParaRPr lang="en-GB" dirty="0"/>
-          </a:p>
-          <a:p>
-            <a:r>
-              <a:rPr lang="en-GB" dirty="0"/>
-              <a:t>2. Win money, win from home.</a:t>
-            </a:r>
-          </a:p>
-          <a:p>
-            <a:endParaRPr lang="en-GB" dirty="0"/>
-          </a:p>
-          <a:p>
-            <a:r>
-              <a:rPr lang="en-GB" dirty="0"/>
-              <a:t>3. Call me now.</a:t>
-            </a:r>
-          </a:p>
-          <a:p>
-            <a:endParaRPr lang="en-GB" dirty="0"/>
-          </a:p>
-          <a:p>
-            <a:r>
-              <a:rPr lang="en-GB" dirty="0"/>
-              <a:t>4. Hello, Call you tomorrow?</a:t>
-            </a:r>
-          </a:p>
-        </p:txBody>
-      </p:sp>
     </p:spTree>
     <p:extLst>
       <p:ext uri="{BB962C8B-B14F-4D97-AF65-F5344CB8AC3E}">
-        <p14:creationId xmlns:p14="http://schemas.microsoft.com/office/powerpoint/2010/main" val="723055390"/>
+        <p14:creationId xmlns:p14="http://schemas.microsoft.com/office/powerpoint/2010/main" val="1421567037"/>
       </p:ext>
     </p:extLst>
   </p:cSld>
@@ -4674,18 +5000,18 @@
           <a:lstStyle/>
           <a:p>
             <a:r>
-              <a:rPr lang="en-GB" dirty="0"/>
-              <a:t>Implementing the Naive Bayes classification</a:t>
+              <a:rPr lang="en-US" dirty="0"/>
+              <a:t>Bag of words approach</a:t>
             </a:r>
           </a:p>
         </p:txBody>
       </p:sp>
       <p:pic>
         <p:nvPicPr>
-          <p:cNvPr id="6" name="Content Placeholder 5">
+          <p:cNvPr id="8" name="Content Placeholder 7">
             <a:extLst>
               <a:ext uri="{FF2B5EF4-FFF2-40B4-BE49-F238E27FC236}">
-                <a16:creationId xmlns:a16="http://schemas.microsoft.com/office/drawing/2014/main" id="{4700A8C6-BA97-42D3-B0D5-2233666B946E}"/>
+                <a16:creationId xmlns:a16="http://schemas.microsoft.com/office/drawing/2014/main" id="{019C6851-F09F-46BE-BF0D-B7A21A82EACD}"/>
               </a:ext>
             </a:extLst>
           </p:cNvPr>
@@ -4704,8 +5030,8 @@
         </p:blipFill>
         <p:spPr>
           <a:xfrm>
-            <a:off x="1716899" y="1963700"/>
-            <a:ext cx="5640504" cy="4061645"/>
+            <a:off x="376403" y="2458488"/>
+            <a:ext cx="8289296" cy="2559828"/>
           </a:xfrm>
         </p:spPr>
       </p:pic>
@@ -4714,7 +5040,7 @@
           <p:cNvPr id="10" name="TextBox 9">
             <a:extLst>
               <a:ext uri="{FF2B5EF4-FFF2-40B4-BE49-F238E27FC236}">
-                <a16:creationId xmlns:a16="http://schemas.microsoft.com/office/drawing/2014/main" id="{133DF418-BBB6-4A49-8843-21238F84E35A}"/>
+                <a16:creationId xmlns:a16="http://schemas.microsoft.com/office/drawing/2014/main" id="{A795BCC8-E854-41CF-BA9F-803965DB298E}"/>
               </a:ext>
             </a:extLst>
           </p:cNvPr>
@@ -4723,8 +5049,8 @@
         </p:nvSpPr>
         <p:spPr>
           <a:xfrm>
-            <a:off x="7695028" y="2278966"/>
-            <a:ext cx="3359826" cy="3170099"/>
+            <a:off x="8820444" y="2141925"/>
+            <a:ext cx="3151164" cy="2862322"/>
           </a:xfrm>
           <a:prstGeom prst="rect">
             <a:avLst/>
@@ -4737,26 +5063,53 @@
           </a:bodyPr>
           <a:lstStyle/>
           <a:p>
-            <a:r>
-              <a:rPr lang="en-GB" sz="2000" dirty="0"/>
-              <a:t>We will be using the </a:t>
-            </a:r>
-            <a:r>
-              <a:rPr lang="en-GB" sz="2000" b="1" dirty="0"/>
-              <a:t>multinomial Naive Bayes</a:t>
-            </a:r>
-            <a:r>
-              <a:rPr lang="en-GB" sz="2000" dirty="0"/>
-              <a:t> implementation. </a:t>
-            </a:r>
-          </a:p>
-          <a:p>
-            <a:endParaRPr lang="en-GB" sz="2000" dirty="0"/>
-          </a:p>
-          <a:p>
-            <a:r>
-              <a:rPr lang="en-GB" sz="2000" dirty="0"/>
-              <a:t>This particular classifier is chosen because, it is well suitable for classification with discrete features (such as in our case, word counts for text classification).</a:t>
+            <a:pPr algn="ctr">
+              <a:lnSpc>
+                <a:spcPct val="300000"/>
+              </a:lnSpc>
+            </a:pPr>
+            <a:r>
+              <a:rPr lang="en-GB" b="1" u="sng" dirty="0"/>
+              <a:t>SMS Texts Messages</a:t>
+            </a:r>
+          </a:p>
+          <a:p>
+            <a:pPr marL="342900" indent="-342900">
+              <a:buAutoNum type="arabicPeriod"/>
+            </a:pPr>
+            <a:r>
+              <a:rPr lang="en-GB" dirty="0"/>
+              <a:t>Hello, how are you!</a:t>
+            </a:r>
+          </a:p>
+          <a:p>
+            <a:pPr marL="342900" indent="-342900">
+              <a:buAutoNum type="arabicPeriod"/>
+            </a:pPr>
+            <a:endParaRPr lang="en-GB" dirty="0"/>
+          </a:p>
+          <a:p>
+            <a:r>
+              <a:rPr lang="en-GB" dirty="0"/>
+              <a:t>2. Win money, win from home.</a:t>
+            </a:r>
+          </a:p>
+          <a:p>
+            <a:endParaRPr lang="en-GB" dirty="0"/>
+          </a:p>
+          <a:p>
+            <a:r>
+              <a:rPr lang="en-GB" dirty="0"/>
+              <a:t>3. Call me now.</a:t>
+            </a:r>
+          </a:p>
+          <a:p>
+            <a:endParaRPr lang="en-GB" dirty="0"/>
+          </a:p>
+          <a:p>
+            <a:r>
+              <a:rPr lang="en-GB" dirty="0"/>
+              <a:t>4. Hello, Call you tomorrow?</a:t>
             </a:r>
           </a:p>
         </p:txBody>
@@ -4764,7 +5117,7 @@
     </p:spTree>
     <p:extLst>
       <p:ext uri="{BB962C8B-B14F-4D97-AF65-F5344CB8AC3E}">
-        <p14:creationId xmlns:p14="http://schemas.microsoft.com/office/powerpoint/2010/main" val="844314920"/>
+        <p14:creationId xmlns:p14="http://schemas.microsoft.com/office/powerpoint/2010/main" val="723055390"/>
       </p:ext>
     </p:extLst>
   </p:cSld>
@@ -4793,7 +5146,13 @@
       </p:grpSpPr>
       <p:sp>
         <p:nvSpPr>
-          <p:cNvPr id="2" name="Title 1"/>
+          <p:cNvPr id="2" name="Title 1">
+            <a:extLst>
+              <a:ext uri="{FF2B5EF4-FFF2-40B4-BE49-F238E27FC236}">
+                <a16:creationId xmlns:a16="http://schemas.microsoft.com/office/drawing/2014/main" id="{6B1C2937-EB57-4A15-9270-D86EF812C76B}"/>
+              </a:ext>
+            </a:extLst>
+          </p:cNvPr>
           <p:cNvSpPr>
             <a:spLocks noGrp="1"/>
           </p:cNvSpPr>
@@ -4808,17 +5167,17 @@
           <a:p>
             <a:r>
               <a:rPr lang="en-GB" dirty="0"/>
-              <a:t>Building Support Vector Classification</a:t>
+              <a:t>Model building - Naïve Bayes Classification</a:t>
             </a:r>
           </a:p>
         </p:txBody>
       </p:sp>
       <p:pic>
         <p:nvPicPr>
-          <p:cNvPr id="7" name="Content Placeholder 6">
+          <p:cNvPr id="6" name="Content Placeholder 5">
             <a:extLst>
               <a:ext uri="{FF2B5EF4-FFF2-40B4-BE49-F238E27FC236}">
-                <a16:creationId xmlns:a16="http://schemas.microsoft.com/office/drawing/2014/main" id="{4C68B834-7664-4F78-93A5-B95C8F055FE9}"/>
+                <a16:creationId xmlns:a16="http://schemas.microsoft.com/office/drawing/2014/main" id="{34C5A684-93BB-4E37-8D60-AF51CD1B84F0}"/>
               </a:ext>
             </a:extLst>
           </p:cNvPr>
@@ -4826,7 +5185,7 @@
             <a:picLocks noGrp="1" noChangeAspect="1"/>
           </p:cNvPicPr>
           <p:nvPr>
-            <p:ph idx="1"/>
+            <p:ph sz="half" idx="1"/>
           </p:nvPr>
         </p:nvPicPr>
         <p:blipFill>
@@ -4837,15 +5196,135 @@
         </p:blipFill>
         <p:spPr>
           <a:xfrm>
-            <a:off x="2958430" y="1881890"/>
-            <a:ext cx="6589571" cy="4199727"/>
+            <a:off x="2257376" y="4709359"/>
+            <a:ext cx="2828925" cy="1095375"/>
           </a:xfrm>
         </p:spPr>
       </p:pic>
+      <p:pic>
+        <p:nvPicPr>
+          <p:cNvPr id="8" name="Content Placeholder 7">
+            <a:extLst>
+              <a:ext uri="{FF2B5EF4-FFF2-40B4-BE49-F238E27FC236}">
+                <a16:creationId xmlns:a16="http://schemas.microsoft.com/office/drawing/2014/main" id="{B306B69A-B644-493E-97E4-91CA3C8446F6}"/>
+              </a:ext>
+            </a:extLst>
+          </p:cNvPr>
+          <p:cNvPicPr>
+            <a:picLocks noGrp="1" noChangeAspect="1"/>
+          </p:cNvPicPr>
+          <p:nvPr>
+            <p:ph sz="half" idx="2"/>
+          </p:nvPr>
+        </p:nvPicPr>
+        <p:blipFill>
+          <a:blip r:embed="rId3"/>
+          <a:stretch>
+            <a:fillRect/>
+          </a:stretch>
+        </p:blipFill>
+        <p:spPr>
+          <a:xfrm>
+            <a:off x="5953971" y="2375812"/>
+            <a:ext cx="5100881" cy="3145622"/>
+          </a:xfrm>
+        </p:spPr>
+      </p:pic>
+      <p:sp>
+        <p:nvSpPr>
+          <p:cNvPr id="9" name="TextBox 8">
+            <a:extLst>
+              <a:ext uri="{FF2B5EF4-FFF2-40B4-BE49-F238E27FC236}">
+                <a16:creationId xmlns:a16="http://schemas.microsoft.com/office/drawing/2014/main" id="{1C921003-532E-45CC-926E-151C767EB6D8}"/>
+              </a:ext>
+            </a:extLst>
+          </p:cNvPr>
+          <p:cNvSpPr txBox="1"/>
+          <p:nvPr/>
+        </p:nvSpPr>
+        <p:spPr>
+          <a:xfrm>
+            <a:off x="1871003" y="1599807"/>
+            <a:ext cx="4107766" cy="2862322"/>
+          </a:xfrm>
+          <a:prstGeom prst="rect">
+            <a:avLst/>
+          </a:prstGeom>
+          <a:noFill/>
+        </p:spPr>
+        <p:txBody>
+          <a:bodyPr wrap="square" rtlCol="0">
+            <a:spAutoFit/>
+          </a:bodyPr>
+          <a:lstStyle/>
+          <a:p>
+            <a:pPr>
+              <a:lnSpc>
+                <a:spcPct val="300000"/>
+              </a:lnSpc>
+            </a:pPr>
+            <a:r>
+              <a:rPr lang="en-GB" dirty="0"/>
+              <a:t>Why Naïve Bayes?</a:t>
+            </a:r>
+          </a:p>
+          <a:p>
+            <a:pPr marL="285750" indent="-285750">
+              <a:buFont typeface="Arial" panose="020B0604020202020204" pitchFamily="34" charset="0"/>
+              <a:buChar char="•"/>
+            </a:pPr>
+            <a:r>
+              <a:rPr lang="en-GB" dirty="0"/>
+              <a:t>Best suited for discrete variables.</a:t>
+            </a:r>
+          </a:p>
+          <a:p>
+            <a:pPr marL="285750" indent="-285750">
+              <a:buFont typeface="Arial" panose="020B0604020202020204" pitchFamily="34" charset="0"/>
+              <a:buChar char="•"/>
+            </a:pPr>
+            <a:r>
+              <a:rPr lang="en-GB" dirty="0"/>
+              <a:t>No interdependency of features.</a:t>
+            </a:r>
+          </a:p>
+          <a:p>
+            <a:pPr>
+              <a:lnSpc>
+                <a:spcPct val="300000"/>
+              </a:lnSpc>
+            </a:pPr>
+            <a:r>
+              <a:rPr lang="en-GB" dirty="0"/>
+              <a:t>What is Naïve Bayes?</a:t>
+            </a:r>
+          </a:p>
+          <a:p>
+            <a:pPr marL="285750" indent="-285750">
+              <a:buFont typeface="Arial" panose="020B0604020202020204" pitchFamily="34" charset="0"/>
+              <a:buChar char="•"/>
+            </a:pPr>
+            <a:r>
+              <a:rPr lang="en-GB" dirty="0"/>
+              <a:t>Conditional Probability</a:t>
+            </a:r>
+          </a:p>
+          <a:p>
+            <a:pPr marL="285750" indent="-285750">
+              <a:buFont typeface="Arial" panose="020B0604020202020204" pitchFamily="34" charset="0"/>
+              <a:buChar char="•"/>
+            </a:pPr>
+            <a:r>
+              <a:rPr lang="en-GB" dirty="0"/>
+              <a:t>Bayes Rule</a:t>
+            </a:r>
+          </a:p>
+        </p:txBody>
+      </p:sp>
     </p:spTree>
     <p:extLst>
       <p:ext uri="{BB962C8B-B14F-4D97-AF65-F5344CB8AC3E}">
-        <p14:creationId xmlns:p14="http://schemas.microsoft.com/office/powerpoint/2010/main" val="939989102"/>
+        <p14:creationId xmlns:p14="http://schemas.microsoft.com/office/powerpoint/2010/main" val="1979735138"/>
       </p:ext>
     </p:extLst>
   </p:cSld>
@@ -4888,62 +5367,89 @@
           <a:lstStyle/>
           <a:p>
             <a:r>
-              <a:rPr lang="en-US" dirty="0"/>
-              <a:t>Model evaluation</a:t>
-            </a:r>
-          </a:p>
-        </p:txBody>
-      </p:sp>
-      <p:sp>
-        <p:nvSpPr>
+              <a:rPr lang="en-GB" dirty="0"/>
+              <a:t>Implementing the Naive Bayes classification</a:t>
+            </a:r>
+          </a:p>
+        </p:txBody>
+      </p:sp>
+      <p:pic>
+        <p:nvPicPr>
           <p:cNvPr id="6" name="Content Placeholder 5">
             <a:extLst>
               <a:ext uri="{FF2B5EF4-FFF2-40B4-BE49-F238E27FC236}">
-                <a16:creationId xmlns:a16="http://schemas.microsoft.com/office/drawing/2014/main" id="{0EBC8287-68DB-4016-9D82-4983F45D3F32}"/>
+                <a16:creationId xmlns:a16="http://schemas.microsoft.com/office/drawing/2014/main" id="{4700A8C6-BA97-42D3-B0D5-2233666B946E}"/>
               </a:ext>
             </a:extLst>
           </p:cNvPr>
-          <p:cNvSpPr>
-            <a:spLocks noGrp="1"/>
-          </p:cNvSpPr>
+          <p:cNvPicPr>
+            <a:picLocks noGrp="1" noChangeAspect="1"/>
+          </p:cNvPicPr>
           <p:nvPr>
             <p:ph idx="1"/>
           </p:nvPr>
-        </p:nvSpPr>
-        <p:spPr>
-          <a:xfrm>
-            <a:off x="1451580" y="2015732"/>
-            <a:ext cx="9603274" cy="3450613"/>
-          </a:xfrm>
-        </p:spPr>
-        <p:txBody>
-          <a:bodyPr/>
-          <a:lstStyle/>
-          <a:p>
-            <a:r>
-              <a:rPr lang="en-GB" dirty="0"/>
-              <a:t>Naive Bayes model can predict the spam messages with 98.4% accuracy.</a:t>
-            </a:r>
-          </a:p>
-          <a:p>
-            <a:r>
-              <a:rPr lang="en-GB" dirty="0"/>
-              <a:t>Support Vector Classification model can predict the spam messages with 99.01% accuracy. </a:t>
-            </a:r>
-          </a:p>
-          <a:p>
-            <a:endParaRPr lang="en-GB" dirty="0"/>
-          </a:p>
-          <a:p>
-            <a:r>
-              <a:rPr lang="en-GB" dirty="0"/>
-              <a:t>Only 11 out of 1115 predictions are wrong from Support Vector Classification model</a:t>
-            </a:r>
-          </a:p>
-          <a:p>
-            <a:r>
-              <a:rPr lang="en-GB" dirty="0"/>
-              <a:t>Naive Bayes model made 17 out of 1115 predictions wrongly.</a:t>
+        </p:nvPicPr>
+        <p:blipFill>
+          <a:blip r:embed="rId2"/>
+          <a:stretch>
+            <a:fillRect/>
+          </a:stretch>
+        </p:blipFill>
+        <p:spPr>
+          <a:xfrm>
+            <a:off x="1716899" y="1963700"/>
+            <a:ext cx="5640504" cy="4061645"/>
+          </a:xfrm>
+        </p:spPr>
+      </p:pic>
+      <p:sp>
+        <p:nvSpPr>
+          <p:cNvPr id="10" name="TextBox 9">
+            <a:extLst>
+              <a:ext uri="{FF2B5EF4-FFF2-40B4-BE49-F238E27FC236}">
+                <a16:creationId xmlns:a16="http://schemas.microsoft.com/office/drawing/2014/main" id="{133DF418-BBB6-4A49-8843-21238F84E35A}"/>
+              </a:ext>
+            </a:extLst>
+          </p:cNvPr>
+          <p:cNvSpPr txBox="1"/>
+          <p:nvPr/>
+        </p:nvSpPr>
+        <p:spPr>
+          <a:xfrm>
+            <a:off x="7695028" y="2278966"/>
+            <a:ext cx="3359826" cy="3170099"/>
+          </a:xfrm>
+          <a:prstGeom prst="rect">
+            <a:avLst/>
+          </a:prstGeom>
+          <a:noFill/>
+        </p:spPr>
+        <p:txBody>
+          <a:bodyPr wrap="square" rtlCol="0">
+            <a:spAutoFit/>
+          </a:bodyPr>
+          <a:lstStyle/>
+          <a:p>
+            <a:r>
+              <a:rPr lang="en-GB" sz="2000" dirty="0"/>
+              <a:t>We will be using the </a:t>
+            </a:r>
+            <a:r>
+              <a:rPr lang="en-GB" sz="2000" b="1" dirty="0"/>
+              <a:t>multinomial Naive Bayes</a:t>
+            </a:r>
+            <a:r>
+              <a:rPr lang="en-GB" sz="2000" dirty="0"/>
+              <a:t> implementation. </a:t>
+            </a:r>
+          </a:p>
+          <a:p>
+            <a:endParaRPr lang="en-GB" sz="2000" dirty="0"/>
+          </a:p>
+          <a:p>
+            <a:r>
+              <a:rPr lang="en-GB" sz="2000" dirty="0"/>
+              <a:t>This particular classifier is chosen because, it is well suitable for classification with discrete features (such as in our case, word counts for text classification).</a:t>
             </a:r>
           </a:p>
         </p:txBody>
@@ -4951,7 +5457,7 @@
     </p:spTree>
     <p:extLst>
       <p:ext uri="{BB962C8B-B14F-4D97-AF65-F5344CB8AC3E}">
-        <p14:creationId xmlns:p14="http://schemas.microsoft.com/office/powerpoint/2010/main" val="1935307973"/>
+        <p14:creationId xmlns:p14="http://schemas.microsoft.com/office/powerpoint/2010/main" val="844314920"/>
       </p:ext>
     </p:extLst>
   </p:cSld>
@@ -4980,7 +5486,13 @@
       </p:grpSpPr>
       <p:sp>
         <p:nvSpPr>
-          <p:cNvPr id="2" name="Title 1"/>
+          <p:cNvPr id="2" name="Title 1">
+            <a:extLst>
+              <a:ext uri="{FF2B5EF4-FFF2-40B4-BE49-F238E27FC236}">
+                <a16:creationId xmlns:a16="http://schemas.microsoft.com/office/drawing/2014/main" id="{9B550C51-33F7-48A2-9A88-EB440E68A435}"/>
+              </a:ext>
+            </a:extLst>
+          </p:cNvPr>
           <p:cNvSpPr>
             <a:spLocks noGrp="1"/>
           </p:cNvSpPr>
@@ -4990,74 +5502,152 @@
         </p:nvSpPr>
         <p:spPr/>
         <p:txBody>
-          <a:bodyPr>
-            <a:normAutofit/>
-          </a:bodyPr>
-          <a:lstStyle/>
-          <a:p>
-            <a:r>
-              <a:rPr lang="en-US" dirty="0"/>
-              <a:t>conclusion</a:t>
-            </a:r>
-          </a:p>
-        </p:txBody>
-      </p:sp>
-      <p:sp>
-        <p:nvSpPr>
+          <a:bodyPr/>
+          <a:lstStyle/>
+          <a:p>
+            <a:r>
+              <a:rPr lang="en-GB" dirty="0"/>
+              <a:t>Model Building – Support vector classifier</a:t>
+            </a:r>
+          </a:p>
+        </p:txBody>
+      </p:sp>
+      <p:pic>
+        <p:nvPicPr>
           <p:cNvPr id="5" name="Content Placeholder 4">
             <a:extLst>
               <a:ext uri="{FF2B5EF4-FFF2-40B4-BE49-F238E27FC236}">
-                <a16:creationId xmlns:a16="http://schemas.microsoft.com/office/drawing/2014/main" id="{E708ECC9-422B-4BC0-8340-AC3301C30299}"/>
+                <a16:creationId xmlns:a16="http://schemas.microsoft.com/office/drawing/2014/main" id="{92577CBB-58D4-486E-AA4A-82DA817AE990}"/>
               </a:ext>
             </a:extLst>
           </p:cNvPr>
-          <p:cNvSpPr>
-            <a:spLocks noGrp="1"/>
-          </p:cNvSpPr>
+          <p:cNvPicPr>
+            <a:picLocks noGrp="1" noChangeAspect="1"/>
+          </p:cNvPicPr>
           <p:nvPr>
             <p:ph idx="1"/>
           </p:nvPr>
-        </p:nvSpPr>
-        <p:spPr>
-          <a:xfrm>
-            <a:off x="1451579" y="2015732"/>
-            <a:ext cx="9603275" cy="3450613"/>
-          </a:xfrm>
-        </p:spPr>
-        <p:txBody>
-          <a:bodyPr>
-            <a:normAutofit/>
+        </p:nvPicPr>
+        <p:blipFill>
+          <a:blip r:embed="rId2"/>
+          <a:stretch>
+            <a:fillRect/>
+          </a:stretch>
+        </p:blipFill>
+        <p:spPr>
+          <a:xfrm>
+            <a:off x="1451579" y="1895958"/>
+            <a:ext cx="6299591" cy="4199727"/>
+          </a:xfrm>
+        </p:spPr>
+      </p:pic>
+      <p:sp>
+        <p:nvSpPr>
+          <p:cNvPr id="6" name="TextBox 5">
+            <a:extLst>
+              <a:ext uri="{FF2B5EF4-FFF2-40B4-BE49-F238E27FC236}">
+                <a16:creationId xmlns:a16="http://schemas.microsoft.com/office/drawing/2014/main" id="{88AC3CBE-6171-418E-AF7B-454A1ABB2FB8}"/>
+              </a:ext>
+            </a:extLst>
+          </p:cNvPr>
+          <p:cNvSpPr txBox="1"/>
+          <p:nvPr/>
+        </p:nvSpPr>
+        <p:spPr>
+          <a:xfrm>
+            <a:off x="8032652" y="2110154"/>
+            <a:ext cx="3235570" cy="3970318"/>
+          </a:xfrm>
+          <a:prstGeom prst="rect">
+            <a:avLst/>
+          </a:prstGeom>
+          <a:noFill/>
+        </p:spPr>
+        <p:txBody>
+          <a:bodyPr wrap="square" rtlCol="0">
+            <a:spAutoFit/>
           </a:bodyPr>
           <a:lstStyle/>
           <a:p>
             <a:r>
-              <a:rPr lang="en-GB" sz="2400" dirty="0"/>
-              <a:t>Based on our models built and evaluation criteria's,</a:t>
-            </a:r>
-          </a:p>
-          <a:p>
-            <a:pPr lvl="1"/>
-            <a:r>
-              <a:rPr lang="en-GB" sz="2400" dirty="0"/>
-              <a:t>For our data, Support Vector Classification seems to be the better model for making the futuristic predictions.</a:t>
-            </a:r>
-          </a:p>
-          <a:p>
-            <a:pPr lvl="1"/>
-            <a:r>
-              <a:rPr lang="en-GB" sz="2400" dirty="0"/>
-              <a:t>Thus, Support Vector Classification is the best model that can predict the future incoming spam messages more accurately for our business problem.</a:t>
-            </a:r>
-          </a:p>
-          <a:p>
-            <a:endParaRPr lang="en-GB" sz="2400" dirty="0"/>
+              <a:rPr lang="en-GB" dirty="0"/>
+              <a:t>Why SVM classifier?</a:t>
+            </a:r>
+          </a:p>
+          <a:p>
+            <a:pPr marL="285750" indent="-285750">
+              <a:buFont typeface="Arial" panose="020B0604020202020204" pitchFamily="34" charset="0"/>
+              <a:buChar char="•"/>
+            </a:pPr>
+            <a:r>
+              <a:rPr lang="en-GB" dirty="0"/>
+              <a:t>Best suited for two class problems.</a:t>
+            </a:r>
+          </a:p>
+          <a:p>
+            <a:pPr marL="285750" indent="-285750">
+              <a:buFont typeface="Arial" panose="020B0604020202020204" pitchFamily="34" charset="0"/>
+              <a:buChar char="•"/>
+            </a:pPr>
+            <a:r>
+              <a:rPr lang="en-GB" dirty="0"/>
+              <a:t>Outliers have less impact as line of separation depends on </a:t>
+            </a:r>
+            <a:r>
+              <a:rPr lang="en-GB" b="1" dirty="0"/>
+              <a:t>Support vectors</a:t>
+            </a:r>
+            <a:r>
+              <a:rPr lang="en-GB" dirty="0"/>
+              <a:t>.</a:t>
+            </a:r>
+          </a:p>
+          <a:p>
+            <a:pPr marL="285750" indent="-285750">
+              <a:buFont typeface="Arial" panose="020B0604020202020204" pitchFamily="34" charset="0"/>
+              <a:buChar char="•"/>
+            </a:pPr>
+            <a:endParaRPr lang="en-GB" dirty="0"/>
+          </a:p>
+          <a:p>
+            <a:r>
+              <a:rPr lang="en-GB" dirty="0"/>
+              <a:t>What is SVM?</a:t>
+            </a:r>
+          </a:p>
+          <a:p>
+            <a:pPr marL="285750" indent="-285750">
+              <a:buFont typeface="Arial" panose="020B0604020202020204" pitchFamily="34" charset="0"/>
+              <a:buChar char="•"/>
+            </a:pPr>
+            <a:r>
+              <a:rPr lang="en-GB" dirty="0"/>
+              <a:t>It is based on Marginal Hyperplane.</a:t>
+            </a:r>
+          </a:p>
+          <a:p>
+            <a:pPr marL="285750" indent="-285750">
+              <a:buFont typeface="Arial" panose="020B0604020202020204" pitchFamily="34" charset="0"/>
+              <a:buChar char="•"/>
+            </a:pPr>
+            <a:r>
+              <a:rPr lang="en-GB" dirty="0"/>
+              <a:t>Kernel trick is used when classes are not linearly separable.</a:t>
+            </a:r>
+          </a:p>
+          <a:p>
+            <a:pPr marL="285750" indent="-285750">
+              <a:buFont typeface="Arial" panose="020B0604020202020204" pitchFamily="34" charset="0"/>
+              <a:buChar char="•"/>
+            </a:pPr>
+            <a:endParaRPr lang="en-GB" dirty="0"/>
           </a:p>
         </p:txBody>
       </p:sp>
     </p:spTree>
     <p:extLst>
       <p:ext uri="{BB962C8B-B14F-4D97-AF65-F5344CB8AC3E}">
-        <p14:creationId xmlns:p14="http://schemas.microsoft.com/office/powerpoint/2010/main" val="364743583"/>
+        <p14:creationId xmlns:p14="http://schemas.microsoft.com/office/powerpoint/2010/main" val="1385142919"/>
       </p:ext>
     </p:extLst>
   </p:cSld>

</xml_diff>